<commit_message>
Small updates on structure
</commit_message>
<xml_diff>
--- a/DDE_MachineLearning_Project/dde_results.pptx
+++ b/DDE_MachineLearning_Project/dde_results.pptx
@@ -276,7 +276,7 @@
           <a:p>
             <a:fld id="{888B5EAE-351F-4271-B2FC-4FD5B44EE96C}" type="datetimeFigureOut">
               <a:rPr lang="de-DE" smtClean="0"/>
-              <a:t>09.01.2022</a:t>
+              <a:t>10.01.2022</a:t>
             </a:fld>
             <a:endParaRPr lang="de-DE"/>
           </a:p>
@@ -476,7 +476,7 @@
           <a:p>
             <a:fld id="{888B5EAE-351F-4271-B2FC-4FD5B44EE96C}" type="datetimeFigureOut">
               <a:rPr lang="de-DE" smtClean="0"/>
-              <a:t>09.01.2022</a:t>
+              <a:t>10.01.2022</a:t>
             </a:fld>
             <a:endParaRPr lang="de-DE"/>
           </a:p>
@@ -686,7 +686,7 @@
           <a:p>
             <a:fld id="{888B5EAE-351F-4271-B2FC-4FD5B44EE96C}" type="datetimeFigureOut">
               <a:rPr lang="de-DE" smtClean="0"/>
-              <a:t>09.01.2022</a:t>
+              <a:t>10.01.2022</a:t>
             </a:fld>
             <a:endParaRPr lang="de-DE"/>
           </a:p>
@@ -886,7 +886,7 @@
           <a:p>
             <a:fld id="{888B5EAE-351F-4271-B2FC-4FD5B44EE96C}" type="datetimeFigureOut">
               <a:rPr lang="de-DE" smtClean="0"/>
-              <a:t>09.01.2022</a:t>
+              <a:t>10.01.2022</a:t>
             </a:fld>
             <a:endParaRPr lang="de-DE"/>
           </a:p>
@@ -1162,7 +1162,7 @@
           <a:p>
             <a:fld id="{888B5EAE-351F-4271-B2FC-4FD5B44EE96C}" type="datetimeFigureOut">
               <a:rPr lang="de-DE" smtClean="0"/>
-              <a:t>09.01.2022</a:t>
+              <a:t>10.01.2022</a:t>
             </a:fld>
             <a:endParaRPr lang="de-DE"/>
           </a:p>
@@ -1430,7 +1430,7 @@
           <a:p>
             <a:fld id="{888B5EAE-351F-4271-B2FC-4FD5B44EE96C}" type="datetimeFigureOut">
               <a:rPr lang="de-DE" smtClean="0"/>
-              <a:t>09.01.2022</a:t>
+              <a:t>10.01.2022</a:t>
             </a:fld>
             <a:endParaRPr lang="de-DE"/>
           </a:p>
@@ -1845,7 +1845,7 @@
           <a:p>
             <a:fld id="{888B5EAE-351F-4271-B2FC-4FD5B44EE96C}" type="datetimeFigureOut">
               <a:rPr lang="de-DE" smtClean="0"/>
-              <a:t>09.01.2022</a:t>
+              <a:t>10.01.2022</a:t>
             </a:fld>
             <a:endParaRPr lang="de-DE"/>
           </a:p>
@@ -1987,7 +1987,7 @@
           <a:p>
             <a:fld id="{888B5EAE-351F-4271-B2FC-4FD5B44EE96C}" type="datetimeFigureOut">
               <a:rPr lang="de-DE" smtClean="0"/>
-              <a:t>09.01.2022</a:t>
+              <a:t>10.01.2022</a:t>
             </a:fld>
             <a:endParaRPr lang="de-DE"/>
           </a:p>
@@ -2100,7 +2100,7 @@
           <a:p>
             <a:fld id="{888B5EAE-351F-4271-B2FC-4FD5B44EE96C}" type="datetimeFigureOut">
               <a:rPr lang="de-DE" smtClean="0"/>
-              <a:t>09.01.2022</a:t>
+              <a:t>10.01.2022</a:t>
             </a:fld>
             <a:endParaRPr lang="de-DE"/>
           </a:p>
@@ -2413,7 +2413,7 @@
           <a:p>
             <a:fld id="{888B5EAE-351F-4271-B2FC-4FD5B44EE96C}" type="datetimeFigureOut">
               <a:rPr lang="de-DE" smtClean="0"/>
-              <a:t>09.01.2022</a:t>
+              <a:t>10.01.2022</a:t>
             </a:fld>
             <a:endParaRPr lang="de-DE"/>
           </a:p>
@@ -2702,7 +2702,7 @@
           <a:p>
             <a:fld id="{888B5EAE-351F-4271-B2FC-4FD5B44EE96C}" type="datetimeFigureOut">
               <a:rPr lang="de-DE" smtClean="0"/>
-              <a:t>09.01.2022</a:t>
+              <a:t>10.01.2022</a:t>
             </a:fld>
             <a:endParaRPr lang="de-DE"/>
           </a:p>
@@ -2945,7 +2945,7 @@
           <a:p>
             <a:fld id="{888B5EAE-351F-4271-B2FC-4FD5B44EE96C}" type="datetimeFigureOut">
               <a:rPr lang="de-DE" smtClean="0"/>
-              <a:t>09.01.2022</a:t>
+              <a:t>10.01.2022</a:t>
             </a:fld>
             <a:endParaRPr lang="de-DE"/>
           </a:p>
@@ -3377,14 +3377,14 @@
           <p:nvPr>
             <p:extLst>
               <p:ext uri="{D42A27DB-BD31-4B8C-83A1-F6EECF244321}">
-                <p14:modId xmlns:p14="http://schemas.microsoft.com/office/powerpoint/2010/main" val="3311883992"/>
+                <p14:modId xmlns:p14="http://schemas.microsoft.com/office/powerpoint/2010/main" val="2583780123"/>
               </p:ext>
             </p:extLst>
           </p:nvPr>
         </p:nvGraphicFramePr>
         <p:xfrm>
-          <a:off x="465600" y="719666"/>
-          <a:ext cx="9961989" cy="4409440"/>
+          <a:off x="134400" y="779400"/>
+          <a:ext cx="11923200" cy="5872480"/>
         </p:xfrm>
         <a:graphic>
           <a:graphicData uri="http://schemas.openxmlformats.org/drawingml/2006/table">
@@ -3393,41 +3393,48 @@
                 <a:tableStyleId>{5C22544A-7EE6-4342-B048-85BDC9FD1C3A}</a:tableStyleId>
               </a:tblPr>
               <a:tblGrid>
-                <a:gridCol w="2464277">
+                <a:gridCol w="2672753">
                   <a:extLst>
                     <a:ext uri="{9D8B030D-6E8A-4147-A177-3AD203B41FA5}">
                       <a16:colId xmlns:a16="http://schemas.microsoft.com/office/drawing/2014/main" val="353048072"/>
                     </a:ext>
                   </a:extLst>
                 </a:gridCol>
-                <a:gridCol w="1393513">
+                <a:gridCol w="1542968">
                   <a:extLst>
                     <a:ext uri="{9D8B030D-6E8A-4147-A177-3AD203B41FA5}">
                       <a16:colId xmlns:a16="http://schemas.microsoft.com/office/drawing/2014/main" val="4154142423"/>
                     </a:ext>
                   </a:extLst>
                 </a:gridCol>
-                <a:gridCol w="2246409">
+                <a:gridCol w="2487337">
                   <a:extLst>
                     <a:ext uri="{9D8B030D-6E8A-4147-A177-3AD203B41FA5}">
                       <a16:colId xmlns:a16="http://schemas.microsoft.com/office/drawing/2014/main" val="1173315652"/>
                     </a:ext>
                   </a:extLst>
                 </a:gridCol>
-                <a:gridCol w="1928895">
+                <a:gridCol w="948602">
                   <a:extLst>
                     <a:ext uri="{9D8B030D-6E8A-4147-A177-3AD203B41FA5}">
                       <a16:colId xmlns:a16="http://schemas.microsoft.com/office/drawing/2014/main" val="1685941792"/>
                     </a:ext>
                   </a:extLst>
                 </a:gridCol>
-                <a:gridCol w="1928895">
+                <a:gridCol w="1290740">
                   <a:extLst>
                     <a:ext uri="{9D8B030D-6E8A-4147-A177-3AD203B41FA5}">
                       <a16:colId xmlns:a16="http://schemas.microsoft.com/office/drawing/2014/main" val="2931450649"/>
                     </a:ext>
                   </a:extLst>
                 </a:gridCol>
+                <a:gridCol w="2980800">
+                  <a:extLst>
+                    <a:ext uri="{9D8B030D-6E8A-4147-A177-3AD203B41FA5}">
+                      <a16:colId xmlns:a16="http://schemas.microsoft.com/office/drawing/2014/main" val="290987983"/>
+                    </a:ext>
+                  </a:extLst>
+                </a:gridCol>
               </a:tblGrid>
               <a:tr h="370840">
                 <a:tc>
@@ -3492,6 +3499,16 @@
                         <a:rPr lang="de-DE" dirty="0"/>
                         <a:t>R^2 Score</a:t>
                       </a:r>
+                    </a:p>
+                  </a:txBody>
+                  <a:tcPr/>
+                </a:tc>
+                <a:tc>
+                  <a:txBody>
+                    <a:bodyPr/>
+                    <a:lstStyle/>
+                    <a:p>
+                      <a:endParaRPr lang="de-DE" dirty="0"/>
                     </a:p>
                   </a:txBody>
                   <a:tcPr/>
@@ -3565,6 +3582,16 @@
                   </a:txBody>
                   <a:tcPr/>
                 </a:tc>
+                <a:tc>
+                  <a:txBody>
+                    <a:bodyPr/>
+                    <a:lstStyle/>
+                    <a:p>
+                      <a:endParaRPr lang="de-DE" dirty="0"/>
+                    </a:p>
+                  </a:txBody>
+                  <a:tcPr/>
+                </a:tc>
                 <a:extLst>
                   <a:ext uri="{0D108BD9-81ED-4DB2-BD59-A6C34878D82A}">
                     <a16:rowId xmlns:a16="http://schemas.microsoft.com/office/drawing/2014/main" val="2345303936"/>
@@ -3631,6 +3658,16 @@
                   </a:txBody>
                   <a:tcPr/>
                 </a:tc>
+                <a:tc>
+                  <a:txBody>
+                    <a:bodyPr/>
+                    <a:lstStyle/>
+                    <a:p>
+                      <a:endParaRPr lang="de-DE" dirty="0"/>
+                    </a:p>
+                  </a:txBody>
+                  <a:tcPr/>
+                </a:tc>
                 <a:extLst>
                   <a:ext uri="{0D108BD9-81ED-4DB2-BD59-A6C34878D82A}">
                     <a16:rowId xmlns:a16="http://schemas.microsoft.com/office/drawing/2014/main" val="2309057353"/>
@@ -3700,6 +3737,16 @@
                   </a:txBody>
                   <a:tcPr/>
                 </a:tc>
+                <a:tc>
+                  <a:txBody>
+                    <a:bodyPr/>
+                    <a:lstStyle/>
+                    <a:p>
+                      <a:endParaRPr lang="de-DE" dirty="0"/>
+                    </a:p>
+                  </a:txBody>
+                  <a:tcPr/>
+                </a:tc>
                 <a:extLst>
                   <a:ext uri="{0D108BD9-81ED-4DB2-BD59-A6C34878D82A}">
                     <a16:rowId xmlns:a16="http://schemas.microsoft.com/office/drawing/2014/main" val="3791644966"/>
@@ -3766,6 +3813,16 @@
                   </a:txBody>
                   <a:tcPr/>
                 </a:tc>
+                <a:tc>
+                  <a:txBody>
+                    <a:bodyPr/>
+                    <a:lstStyle/>
+                    <a:p>
+                      <a:endParaRPr lang="de-DE" dirty="0"/>
+                    </a:p>
+                  </a:txBody>
+                  <a:tcPr/>
+                </a:tc>
                 <a:extLst>
                   <a:ext uri="{0D108BD9-81ED-4DB2-BD59-A6C34878D82A}">
                     <a16:rowId xmlns:a16="http://schemas.microsoft.com/office/drawing/2014/main" val="984695646"/>
@@ -3835,6 +3892,16 @@
                   </a:txBody>
                   <a:tcPr/>
                 </a:tc>
+                <a:tc>
+                  <a:txBody>
+                    <a:bodyPr/>
+                    <a:lstStyle/>
+                    <a:p>
+                      <a:endParaRPr lang="de-DE" dirty="0"/>
+                    </a:p>
+                  </a:txBody>
+                  <a:tcPr/>
+                </a:tc>
                 <a:extLst>
                   <a:ext uri="{0D108BD9-81ED-4DB2-BD59-A6C34878D82A}">
                     <a16:rowId xmlns:a16="http://schemas.microsoft.com/office/drawing/2014/main" val="2121374170"/>
@@ -3904,6 +3971,16 @@
                   </a:txBody>
                   <a:tcPr/>
                 </a:tc>
+                <a:tc>
+                  <a:txBody>
+                    <a:bodyPr/>
+                    <a:lstStyle/>
+                    <a:p>
+                      <a:endParaRPr lang="de-DE" dirty="0"/>
+                    </a:p>
+                  </a:txBody>
+                  <a:tcPr/>
+                </a:tc>
                 <a:extLst>
                   <a:ext uri="{0D108BD9-81ED-4DB2-BD59-A6C34878D82A}">
                     <a16:rowId xmlns:a16="http://schemas.microsoft.com/office/drawing/2014/main" val="4194800166"/>
@@ -3973,6 +4050,16 @@
                   </a:txBody>
                   <a:tcPr/>
                 </a:tc>
+                <a:tc>
+                  <a:txBody>
+                    <a:bodyPr/>
+                    <a:lstStyle/>
+                    <a:p>
+                      <a:endParaRPr lang="de-DE" dirty="0"/>
+                    </a:p>
+                  </a:txBody>
+                  <a:tcPr/>
+                </a:tc>
                 <a:extLst>
                   <a:ext uri="{0D108BD9-81ED-4DB2-BD59-A6C34878D82A}">
                     <a16:rowId xmlns:a16="http://schemas.microsoft.com/office/drawing/2014/main" val="2673006100"/>
@@ -4042,6 +4129,16 @@
                   </a:txBody>
                   <a:tcPr/>
                 </a:tc>
+                <a:tc>
+                  <a:txBody>
+                    <a:bodyPr/>
+                    <a:lstStyle/>
+                    <a:p>
+                      <a:endParaRPr lang="de-DE" dirty="0"/>
+                    </a:p>
+                  </a:txBody>
+                  <a:tcPr/>
+                </a:tc>
                 <a:extLst>
                   <a:ext uri="{0D108BD9-81ED-4DB2-BD59-A6C34878D82A}">
                     <a16:rowId xmlns:a16="http://schemas.microsoft.com/office/drawing/2014/main" val="1081194975"/>
@@ -4114,6 +4211,16 @@
                   </a:txBody>
                   <a:tcPr/>
                 </a:tc>
+                <a:tc>
+                  <a:txBody>
+                    <a:bodyPr/>
+                    <a:lstStyle/>
+                    <a:p>
+                      <a:endParaRPr lang="de-DE" dirty="0"/>
+                    </a:p>
+                  </a:txBody>
+                  <a:tcPr/>
+                </a:tc>
                 <a:extLst>
                   <a:ext uri="{0D108BD9-81ED-4DB2-BD59-A6C34878D82A}">
                     <a16:rowId xmlns:a16="http://schemas.microsoft.com/office/drawing/2014/main" val="4014538829"/>
@@ -4183,6 +4290,16 @@
                   </a:txBody>
                   <a:tcPr/>
                 </a:tc>
+                <a:tc>
+                  <a:txBody>
+                    <a:bodyPr/>
+                    <a:lstStyle/>
+                    <a:p>
+                      <a:endParaRPr lang="de-DE" dirty="0"/>
+                    </a:p>
+                  </a:txBody>
+                  <a:tcPr/>
+                </a:tc>
                 <a:extLst>
                   <a:ext uri="{0D108BD9-81ED-4DB2-BD59-A6C34878D82A}">
                     <a16:rowId xmlns:a16="http://schemas.microsoft.com/office/drawing/2014/main" val="4029173210"/>
@@ -4246,8 +4363,18 @@
                     <a:p>
                       <a:r>
                         <a:rPr lang="de-DE" dirty="0"/>
-                        <a:t>0,64</a:t>
-                      </a:r>
+                        <a:t>0,69</a:t>
+                      </a:r>
+                    </a:p>
+                  </a:txBody>
+                  <a:tcPr/>
+                </a:tc>
+                <a:tc>
+                  <a:txBody>
+                    <a:bodyPr/>
+                    <a:lstStyle/>
+                    <a:p>
+                      <a:endParaRPr lang="de-DE" dirty="0"/>
                     </a:p>
                   </a:txBody>
                   <a:tcPr/>
@@ -4255,6 +4382,422 @@
                 <a:extLst>
                   <a:ext uri="{0D108BD9-81ED-4DB2-BD59-A6C34878D82A}">
                     <a16:rowId xmlns:a16="http://schemas.microsoft.com/office/drawing/2014/main" val="1289963371"/>
+                  </a:ext>
+                </a:extLst>
+              </a:tr>
+              <a:tr h="0">
+                <a:tc>
+                  <a:txBody>
+                    <a:bodyPr/>
+                    <a:lstStyle/>
+                    <a:p>
+                      <a:r>
+                        <a:rPr lang="de-DE" dirty="0"/>
+                        <a:t>10_ED_LSTM_WL</a:t>
+                      </a:r>
+                    </a:p>
+                  </a:txBody>
+                  <a:tcPr/>
+                </a:tc>
+                <a:tc>
+                  <a:txBody>
+                    <a:bodyPr/>
+                    <a:lstStyle/>
+                    <a:p>
+                      <a:r>
+                        <a:rPr lang="de-DE" dirty="0"/>
+                        <a:t>EDLSTM</a:t>
+                      </a:r>
+                    </a:p>
+                  </a:txBody>
+                  <a:tcPr/>
+                </a:tc>
+                <a:tc>
+                  <a:txBody>
+                    <a:bodyPr/>
+                    <a:lstStyle/>
+                    <a:p>
+                      <a:r>
+                        <a:rPr lang="de-DE" dirty="0"/>
+                        <a:t>MS_EDLSTM_WL</a:t>
+                      </a:r>
+                    </a:p>
+                  </a:txBody>
+                  <a:tcPr/>
+                </a:tc>
+                <a:tc>
+                  <a:txBody>
+                    <a:bodyPr/>
+                    <a:lstStyle/>
+                    <a:p>
+                      <a:endParaRPr lang="de-DE" dirty="0"/>
+                    </a:p>
+                  </a:txBody>
+                  <a:tcPr/>
+                </a:tc>
+                <a:tc>
+                  <a:txBody>
+                    <a:bodyPr/>
+                    <a:lstStyle/>
+                    <a:p>
+                      <a:r>
+                        <a:rPr lang="de-DE" dirty="0"/>
+                        <a:t>0,81</a:t>
+                      </a:r>
+                    </a:p>
+                  </a:txBody>
+                  <a:tcPr/>
+                </a:tc>
+                <a:tc>
+                  <a:txBody>
+                    <a:bodyPr/>
+                    <a:lstStyle/>
+                    <a:p>
+                      <a:r>
+                        <a:rPr lang="de-DE" dirty="0"/>
+                        <a:t>Additional </a:t>
+                      </a:r>
+                      <a:r>
+                        <a:rPr lang="de-DE" dirty="0" err="1"/>
+                        <a:t>Weak</a:t>
+                      </a:r>
+                      <a:r>
+                        <a:rPr lang="de-DE" dirty="0"/>
+                        <a:t> </a:t>
+                      </a:r>
+                      <a:r>
+                        <a:rPr lang="de-DE" dirty="0" err="1"/>
+                        <a:t>learners</a:t>
+                      </a:r>
+                      <a:endParaRPr lang="de-DE" dirty="0"/>
+                    </a:p>
+                  </a:txBody>
+                  <a:tcPr/>
+                </a:tc>
+                <a:extLst>
+                  <a:ext uri="{0D108BD9-81ED-4DB2-BD59-A6C34878D82A}">
+                    <a16:rowId xmlns:a16="http://schemas.microsoft.com/office/drawing/2014/main" val="802403190"/>
+                  </a:ext>
+                </a:extLst>
+              </a:tr>
+              <a:tr h="0">
+                <a:tc>
+                  <a:txBody>
+                    <a:bodyPr/>
+                    <a:lstStyle/>
+                    <a:p>
+                      <a:r>
+                        <a:rPr lang="de-DE" dirty="0"/>
+                        <a:t>10_ED_LSTM_WL2</a:t>
+                      </a:r>
+                    </a:p>
+                  </a:txBody>
+                  <a:tcPr/>
+                </a:tc>
+                <a:tc>
+                  <a:txBody>
+                    <a:bodyPr/>
+                    <a:lstStyle/>
+                    <a:p>
+                      <a:r>
+                        <a:rPr lang="de-DE" dirty="0"/>
+                        <a:t>EDLSTM</a:t>
+                      </a:r>
+                    </a:p>
+                  </a:txBody>
+                  <a:tcPr/>
+                </a:tc>
+                <a:tc>
+                  <a:txBody>
+                    <a:bodyPr/>
+                    <a:lstStyle/>
+                    <a:p>
+                      <a:r>
+                        <a:rPr lang="de-DE" dirty="0"/>
+                        <a:t>MS_EDLSTM_WL2</a:t>
+                      </a:r>
+                    </a:p>
+                  </a:txBody>
+                  <a:tcPr/>
+                </a:tc>
+                <a:tc>
+                  <a:txBody>
+                    <a:bodyPr/>
+                    <a:lstStyle/>
+                    <a:p>
+                      <a:endParaRPr lang="de-DE" dirty="0"/>
+                    </a:p>
+                  </a:txBody>
+                  <a:tcPr/>
+                </a:tc>
+                <a:tc>
+                  <a:txBody>
+                    <a:bodyPr/>
+                    <a:lstStyle/>
+                    <a:p>
+                      <a:r>
+                        <a:rPr lang="de-DE" dirty="0"/>
+                        <a:t>0,83</a:t>
+                      </a:r>
+                    </a:p>
+                  </a:txBody>
+                  <a:tcPr/>
+                </a:tc>
+                <a:tc>
+                  <a:txBody>
+                    <a:bodyPr/>
+                    <a:lstStyle/>
+                    <a:p>
+                      <a:r>
+                        <a:rPr lang="de-DE" dirty="0"/>
+                        <a:t>14 </a:t>
+                      </a:r>
+                      <a:r>
+                        <a:rPr lang="de-DE" dirty="0" err="1"/>
+                        <a:t>day</a:t>
+                      </a:r>
+                      <a:r>
+                        <a:rPr lang="de-DE" dirty="0"/>
+                        <a:t> </a:t>
+                      </a:r>
+                      <a:r>
+                        <a:rPr lang="de-DE" dirty="0" err="1"/>
+                        <a:t>data</a:t>
+                      </a:r>
+                      <a:r>
+                        <a:rPr lang="de-DE" dirty="0"/>
+                        <a:t> </a:t>
+                      </a:r>
+                      <a:r>
+                        <a:rPr lang="de-DE" dirty="0" err="1"/>
+                        <a:t>set</a:t>
+                      </a:r>
+                      <a:endParaRPr lang="de-DE" dirty="0"/>
+                    </a:p>
+                  </a:txBody>
+                  <a:tcPr/>
+                </a:tc>
+                <a:extLst>
+                  <a:ext uri="{0D108BD9-81ED-4DB2-BD59-A6C34878D82A}">
+                    <a16:rowId xmlns:a16="http://schemas.microsoft.com/office/drawing/2014/main" val="4104527560"/>
+                  </a:ext>
+                </a:extLst>
+              </a:tr>
+              <a:tr h="0">
+                <a:tc>
+                  <a:txBody>
+                    <a:bodyPr/>
+                    <a:lstStyle/>
+                    <a:p>
+                      <a:r>
+                        <a:rPr lang="de-DE" dirty="0"/>
+                        <a:t>10_ED_LSTM_WL2_1</a:t>
+                      </a:r>
+                    </a:p>
+                  </a:txBody>
+                  <a:tcPr/>
+                </a:tc>
+                <a:tc>
+                  <a:txBody>
+                    <a:bodyPr/>
+                    <a:lstStyle/>
+                    <a:p>
+                      <a:r>
+                        <a:rPr lang="de-DE" dirty="0"/>
+                        <a:t>EDLSTM</a:t>
+                      </a:r>
+                    </a:p>
+                  </a:txBody>
+                  <a:tcPr/>
+                </a:tc>
+                <a:tc>
+                  <a:txBody>
+                    <a:bodyPr/>
+                    <a:lstStyle/>
+                    <a:p>
+                      <a:pPr marL="0" marR="0" lvl="0" indent="0" algn="l" defTabSz="914400" rtl="0" eaLnBrk="1" fontAlgn="auto" latinLnBrk="0" hangingPunct="1">
+                        <a:lnSpc>
+                          <a:spcPct val="100000"/>
+                        </a:lnSpc>
+                        <a:spcBef>
+                          <a:spcPts val="0"/>
+                        </a:spcBef>
+                        <a:spcAft>
+                          <a:spcPts val="0"/>
+                        </a:spcAft>
+                        <a:buClrTx/>
+                        <a:buSzTx/>
+                        <a:buFontTx/>
+                        <a:buNone/>
+                        <a:tabLst/>
+                        <a:defRPr/>
+                      </a:pPr>
+                      <a:r>
+                        <a:rPr lang="de-DE" dirty="0"/>
+                        <a:t>MS_EDLSTM_WL2</a:t>
+                      </a:r>
+                    </a:p>
+                  </a:txBody>
+                  <a:tcPr/>
+                </a:tc>
+                <a:tc>
+                  <a:txBody>
+                    <a:bodyPr/>
+                    <a:lstStyle/>
+                    <a:p>
+                      <a:endParaRPr lang="de-DE" dirty="0"/>
+                    </a:p>
+                  </a:txBody>
+                  <a:tcPr/>
+                </a:tc>
+                <a:tc>
+                  <a:txBody>
+                    <a:bodyPr/>
+                    <a:lstStyle/>
+                    <a:p>
+                      <a:r>
+                        <a:rPr lang="de-DE" dirty="0"/>
+                        <a:t>0,81</a:t>
+                      </a:r>
+                    </a:p>
+                  </a:txBody>
+                  <a:tcPr/>
+                </a:tc>
+                <a:tc>
+                  <a:txBody>
+                    <a:bodyPr/>
+                    <a:lstStyle/>
+                    <a:p>
+                      <a:r>
+                        <a:rPr lang="de-DE" dirty="0"/>
+                        <a:t>ELU Layer </a:t>
+                      </a:r>
+                    </a:p>
+                  </a:txBody>
+                  <a:tcPr/>
+                </a:tc>
+                <a:extLst>
+                  <a:ext uri="{0D108BD9-81ED-4DB2-BD59-A6C34878D82A}">
+                    <a16:rowId xmlns:a16="http://schemas.microsoft.com/office/drawing/2014/main" val="1805830603"/>
+                  </a:ext>
+                </a:extLst>
+              </a:tr>
+              <a:tr h="0">
+                <a:tc>
+                  <a:txBody>
+                    <a:bodyPr/>
+                    <a:lstStyle/>
+                    <a:p>
+                      <a:r>
+                        <a:rPr lang="de-DE" dirty="0"/>
+                        <a:t>10_ED_LSTM_WL3</a:t>
+                      </a:r>
+                    </a:p>
+                  </a:txBody>
+                  <a:tcPr/>
+                </a:tc>
+                <a:tc>
+                  <a:txBody>
+                    <a:bodyPr/>
+                    <a:lstStyle/>
+                    <a:p>
+                      <a:r>
+                        <a:rPr lang="de-DE" dirty="0"/>
+                        <a:t>EDLSTM</a:t>
+                      </a:r>
+                    </a:p>
+                  </a:txBody>
+                  <a:tcPr/>
+                </a:tc>
+                <a:tc>
+                  <a:txBody>
+                    <a:bodyPr/>
+                    <a:lstStyle/>
+                    <a:p>
+                      <a:pPr marL="0" marR="0" lvl="0" indent="0" algn="l" defTabSz="914400" rtl="0" eaLnBrk="1" fontAlgn="auto" latinLnBrk="0" hangingPunct="1">
+                        <a:lnSpc>
+                          <a:spcPct val="100000"/>
+                        </a:lnSpc>
+                        <a:spcBef>
+                          <a:spcPts val="0"/>
+                        </a:spcBef>
+                        <a:spcAft>
+                          <a:spcPts val="0"/>
+                        </a:spcAft>
+                        <a:buClrTx/>
+                        <a:buSzTx/>
+                        <a:buFontTx/>
+                        <a:buNone/>
+                        <a:tabLst/>
+                        <a:defRPr/>
+                      </a:pPr>
+                      <a:r>
+                        <a:rPr lang="de-DE" dirty="0"/>
+                        <a:t>MS_EDLSTM_WL3</a:t>
+                      </a:r>
+                    </a:p>
+                  </a:txBody>
+                  <a:tcPr/>
+                </a:tc>
+                <a:tc>
+                  <a:txBody>
+                    <a:bodyPr/>
+                    <a:lstStyle/>
+                    <a:p>
+                      <a:endParaRPr lang="de-DE" dirty="0"/>
+                    </a:p>
+                  </a:txBody>
+                  <a:tcPr/>
+                </a:tc>
+                <a:tc>
+                  <a:txBody>
+                    <a:bodyPr/>
+                    <a:lstStyle/>
+                    <a:p>
+                      <a:r>
+                        <a:rPr lang="de-DE" dirty="0"/>
+                        <a:t>0,33</a:t>
+                      </a:r>
+                    </a:p>
+                  </a:txBody>
+                  <a:tcPr/>
+                </a:tc>
+                <a:tc>
+                  <a:txBody>
+                    <a:bodyPr/>
+                    <a:lstStyle/>
+                    <a:p>
+                      <a:r>
+                        <a:rPr lang="de-DE" dirty="0"/>
+                        <a:t>28 </a:t>
+                      </a:r>
+                      <a:r>
+                        <a:rPr lang="de-DE" dirty="0" err="1"/>
+                        <a:t>day</a:t>
+                      </a:r>
+                      <a:r>
+                        <a:rPr lang="de-DE" dirty="0"/>
+                        <a:t> </a:t>
+                      </a:r>
+                      <a:r>
+                        <a:rPr lang="de-DE" dirty="0" err="1"/>
+                        <a:t>data</a:t>
+                      </a:r>
+                      <a:r>
+                        <a:rPr lang="de-DE"/>
+                        <a:t> set</a:t>
+                      </a:r>
+                      <a:r>
+                        <a:rPr lang="de-DE" dirty="0"/>
+                        <a:t> </a:t>
+                      </a:r>
+                    </a:p>
+                  </a:txBody>
+                  <a:tcPr/>
+                </a:tc>
+                <a:extLst>
+                  <a:ext uri="{0D108BD9-81ED-4DB2-BD59-A6C34878D82A}">
+                    <a16:rowId xmlns:a16="http://schemas.microsoft.com/office/drawing/2014/main" val="872387024"/>
                   </a:ext>
                 </a:extLst>
               </a:tr>

</xml_diff>